<commit_message>
Added QR code for compainion website
</commit_message>
<xml_diff>
--- a/cl-ai-in-the-curriculum.pptx
+++ b/cl-ai-in-the-curriculum.pptx
@@ -5,7 +5,7 @@
     <p:sldMasterId id="2147483648" r:id="rId1"/>
   </p:sldMasterIdLst>
   <p:notesMasterIdLst>
-    <p:notesMasterId r:id="rId16"/>
+    <p:notesMasterId r:id="rId17"/>
   </p:notesMasterIdLst>
   <p:sldIdLst>
     <p:sldId id="256" r:id="rId2"/>
@@ -22,6 +22,7 @@
     <p:sldId id="267" r:id="rId13"/>
     <p:sldId id="268" r:id="rId14"/>
     <p:sldId id="269" r:id="rId15"/>
+    <p:sldId id="270" r:id="rId16"/>
   </p:sldIdLst>
   <p:sldSz cx="9144000" cy="5143500" type="screen16x9"/>
   <p:notesSz cx="6858000" cy="9144000"/>
@@ -653,7 +654,7 @@
           <a:p>
             <a:fld id="{18BDFEC3-8487-43E8-A154-7C12CBC1FFF2}" type="slidenum">
               <a:rPr lang="en-US"/>
-              <a:t>2</a:t>
+              <a:t>3</a:t>
             </a:fld>
             <a:endParaRPr lang="en-US"/>
           </a:p>
@@ -825,7 +826,7 @@
           <a:p>
             <a:fld id="{18BDFEC3-8487-43E8-A154-7C12CBC1FFF2}" type="slidenum">
               <a:rPr lang="en-US"/>
-              <a:t>11</a:t>
+              <a:t>12</a:t>
             </a:fld>
             <a:endParaRPr lang="en-US"/>
           </a:p>
@@ -967,7 +968,7 @@
           <a:p>
             <a:fld id="{18BDFEC3-8487-43E8-A154-7C12CBC1FFF2}" type="slidenum">
               <a:rPr lang="en-US"/>
-              <a:t>12</a:t>
+              <a:t>13</a:t>
             </a:fld>
             <a:endParaRPr lang="en-US"/>
           </a:p>
@@ -1107,7 +1108,7 @@
           <a:p>
             <a:fld id="{18BDFEC3-8487-43E8-A154-7C12CBC1FFF2}" type="slidenum">
               <a:rPr lang="en-US"/>
-              <a:t>13</a:t>
+              <a:t>14</a:t>
             </a:fld>
             <a:endParaRPr lang="en-US"/>
           </a:p>
@@ -1311,7 +1312,7 @@
           <a:p>
             <a:fld id="{18BDFEC3-8487-43E8-A154-7C12CBC1FFF2}" type="slidenum">
               <a:rPr lang="en-US"/>
-              <a:t>3</a:t>
+              <a:t>4</a:t>
             </a:fld>
             <a:endParaRPr lang="en-US"/>
           </a:p>
@@ -1509,7 +1510,7 @@
           <a:p>
             <a:fld id="{18BDFEC3-8487-43E8-A154-7C12CBC1FFF2}" type="slidenum">
               <a:rPr lang="en-US"/>
-              <a:t>4</a:t>
+              <a:t>5</a:t>
             </a:fld>
             <a:endParaRPr lang="en-US"/>
           </a:p>
@@ -1659,7 +1660,7 @@
           <a:p>
             <a:fld id="{18BDFEC3-8487-43E8-A154-7C12CBC1FFF2}" type="slidenum">
               <a:rPr lang="en-US"/>
-              <a:t>5</a:t>
+              <a:t>6</a:t>
             </a:fld>
             <a:endParaRPr lang="en-US"/>
           </a:p>
@@ -1805,7 +1806,7 @@
           <a:p>
             <a:fld id="{18BDFEC3-8487-43E8-A154-7C12CBC1FFF2}" type="slidenum">
               <a:rPr lang="en-US"/>
-              <a:t>6</a:t>
+              <a:t>7</a:t>
             </a:fld>
             <a:endParaRPr lang="en-US"/>
           </a:p>
@@ -2009,7 +2010,7 @@
           <a:p>
             <a:fld id="{18BDFEC3-8487-43E8-A154-7C12CBC1FFF2}" type="slidenum">
               <a:rPr lang="en-US"/>
-              <a:t>7</a:t>
+              <a:t>8</a:t>
             </a:fld>
             <a:endParaRPr lang="en-US"/>
           </a:p>
@@ -2195,7 +2196,7 @@
           <a:p>
             <a:fld id="{18BDFEC3-8487-43E8-A154-7C12CBC1FFF2}" type="slidenum">
               <a:rPr lang="en-US"/>
-              <a:t>8</a:t>
+              <a:t>9</a:t>
             </a:fld>
             <a:endParaRPr lang="en-US"/>
           </a:p>
@@ -2367,7 +2368,7 @@
           <a:p>
             <a:fld id="{18BDFEC3-8487-43E8-A154-7C12CBC1FFF2}" type="slidenum">
               <a:rPr lang="en-US"/>
-              <a:t>9</a:t>
+              <a:t>10</a:t>
             </a:fld>
             <a:endParaRPr lang="en-US"/>
           </a:p>
@@ -2553,7 +2554,7 @@
           <a:p>
             <a:fld id="{18BDFEC3-8487-43E8-A154-7C12CBC1FFF2}" type="slidenum">
               <a:rPr lang="en-US"/>
-              <a:t>10</a:t>
+              <a:t>11</a:t>
             </a:fld>
             <a:endParaRPr lang="en-US"/>
           </a:p>
@@ -5635,7 +5636,7 @@
             </a:pPr>
             <a:r>
               <a:rPr/>
-              <a:t>Showcase: Curriculum Curator (FLX)</a:t>
+              <a:t>Quick Win: 30-Minute Experiment</a:t>
             </a:r>
           </a:p>
         </p:txBody>
@@ -5658,33 +5659,33 @@
             <a:pPr lvl="0"/>
             <a:r>
               <a:rPr b="1"/>
-              <a:t>Tool</a:t>
-            </a:r>
-            <a:r>
-              <a:rPr/>
-              <a:t>: Import → Restructure → Save 80% time</a:t>
+              <a:t>What</a:t>
+            </a:r>
+            <a:r>
+              <a:rPr/>
+              <a:t>: Worksheet → HTML in 30 min</a:t>
             </a:r>
           </a:p>
           <a:p>
             <a:pPr lvl="0"/>
             <a:r>
               <a:rPr b="1"/>
-              <a:t>Value</a:t>
-            </a:r>
-            <a:r>
-              <a:rPr/>
-              <a:t>: Supports staff, not replaces</a:t>
+              <a:t>Result</a:t>
+            </a:r>
+            <a:r>
+              <a:rPr/>
+              <a:t>: Upload both verisons, more engagement</a:t>
             </a:r>
           </a:p>
           <a:p>
             <a:pPr lvl="0"/>
             <a:r>
               <a:rPr b="1"/>
-              <a:t>Takeaway</a:t>
-            </a:r>
-            <a:r>
-              <a:rPr/>
-              <a:t>: Efficiency</a:t>
+              <a:t>Key Insight</a:t>
+            </a:r>
+            <a:r>
+              <a:rPr/>
+              <a:t>: Options, not replacements</a:t>
             </a:r>
           </a:p>
         </p:txBody>
@@ -5731,7 +5732,7 @@
             </a:pPr>
             <a:r>
               <a:rPr/>
-              <a:t>Questions to Guide Your Thinking</a:t>
+              <a:t>Showcase: Curriculum Curator (FLX)</a:t>
             </a:r>
           </a:p>
         </p:txBody>
@@ -5753,29 +5754,34 @@
           <a:p>
             <a:pPr lvl="0"/>
             <a:r>
-              <a:rPr/>
-              <a:t>Where can AI save time?</a:t>
-            </a:r>
-          </a:p>
-          <a:p>
-            <a:pPr lvl="0"/>
-            <a:r>
-              <a:rPr/>
-              <a:t>How could students practice discipline-specific skills?</a:t>
-            </a:r>
-          </a:p>
-          <a:p>
-            <a:pPr lvl="0"/>
-            <a:r>
-              <a:rPr/>
-              <a:t>What risks/barriers must we prepare for?</a:t>
-            </a:r>
-          </a:p>
-          <a:p>
-            <a:pPr lvl="0"/>
-            <a:r>
-              <a:rPr/>
-              <a:t>How do we move past AI shame?</a:t>
+              <a:rPr b="1"/>
+              <a:t>Tool</a:t>
+            </a:r>
+            <a:r>
+              <a:rPr/>
+              <a:t>: Import → Restructure → Save 80% time</a:t>
+            </a:r>
+          </a:p>
+          <a:p>
+            <a:pPr lvl="0"/>
+            <a:r>
+              <a:rPr b="1"/>
+              <a:t>Value</a:t>
+            </a:r>
+            <a:r>
+              <a:rPr/>
+              <a:t>: Supports staff, not replaces</a:t>
+            </a:r>
+          </a:p>
+          <a:p>
+            <a:pPr lvl="0"/>
+            <a:r>
+              <a:rPr b="1"/>
+              <a:t>Takeaway</a:t>
+            </a:r>
+            <a:r>
+              <a:rPr/>
+              <a:t>: Efficiency</a:t>
             </a:r>
           </a:p>
         </p:txBody>
@@ -5822,7 +5828,7 @@
             </a:pPr>
             <a:r>
               <a:rPr/>
-              <a:t>Let’s Discuss</a:t>
+              <a:t>Questions to Guide Your Thinking</a:t>
             </a:r>
           </a:p>
         </p:txBody>
@@ -5845,28 +5851,28 @@
             <a:pPr lvl="0"/>
             <a:r>
               <a:rPr/>
-              <a:t>What’s one small thing you could try next week?</a:t>
-            </a:r>
-          </a:p>
-          <a:p>
-            <a:pPr lvl="0"/>
-            <a:r>
-              <a:rPr/>
-              <a:t>What concerns need addressing?</a:t>
-            </a:r>
-          </a:p>
-          <a:p>
-            <a:pPr lvl="0"/>
-            <a:r>
-              <a:rPr/>
-              <a:t>How might your discipline benefit/challenge?</a:t>
-            </a:r>
-          </a:p>
-          <a:p>
-            <a:pPr lvl="0"/>
-            <a:r>
-              <a:rPr/>
-              <a:t>Have you felt AI shame?</a:t>
+              <a:t>Where can AI save time?</a:t>
+            </a:r>
+          </a:p>
+          <a:p>
+            <a:pPr lvl="0"/>
+            <a:r>
+              <a:rPr/>
+              <a:t>How could students practice discipline-specific skills?</a:t>
+            </a:r>
+          </a:p>
+          <a:p>
+            <a:pPr lvl="0"/>
+            <a:r>
+              <a:rPr/>
+              <a:t>What risks/barriers must we prepare for?</a:t>
+            </a:r>
+          </a:p>
+          <a:p>
+            <a:pPr lvl="0"/>
+            <a:r>
+              <a:rPr/>
+              <a:t>How do we move past AI shame?</a:t>
             </a:r>
           </a:p>
         </p:txBody>
@@ -5913,7 +5919,7 @@
             </a:pPr>
             <a:r>
               <a:rPr/>
-              <a:t>Thank You</a:t>
+              <a:t>Let’s Discuss</a:t>
             </a:r>
           </a:p>
         </p:txBody>
@@ -5935,26 +5941,29 @@
           <a:p>
             <a:pPr lvl="0"/>
             <a:r>
-              <a:rPr i="1"/>
-              <a:t>“Not about answers — just questions worth asking… together, without shame”</a:t>
-            </a:r>
-          </a:p>
-          <a:p>
-            <a:pPr lvl="0"/>
-            <a:r>
-              <a:rPr b="1"/>
-              <a:t>Next Step</a:t>
-            </a:r>
-            <a:r>
-              <a:rPr/>
-              <a:t>: Try one small experiment, share results</a:t>
-            </a:r>
-          </a:p>
-          <a:p>
-            <a:pPr lvl="0"/>
-            <a:r>
-              <a:rPr i="1"/>
-              <a:t>“The best way to predict the future is to help create it”</a:t>
+              <a:rPr/>
+              <a:t>What’s one small thing you could try next week?</a:t>
+            </a:r>
+          </a:p>
+          <a:p>
+            <a:pPr lvl="0"/>
+            <a:r>
+              <a:rPr/>
+              <a:t>What concerns need addressing?</a:t>
+            </a:r>
+          </a:p>
+          <a:p>
+            <a:pPr lvl="0"/>
+            <a:r>
+              <a:rPr/>
+              <a:t>How might your discipline benefit/challenge?</a:t>
+            </a:r>
+          </a:p>
+          <a:p>
+            <a:pPr lvl="0"/>
+            <a:r>
+              <a:rPr/>
+              <a:t>Have you felt AI shame?</a:t>
             </a:r>
           </a:p>
         </p:txBody>
@@ -6001,6 +6010,94 @@
             </a:pPr>
             <a:r>
               <a:rPr/>
+              <a:t>Thank You</a:t>
+            </a:r>
+          </a:p>
+        </p:txBody>
+      </p:sp>
+      <p:sp>
+        <p:nvSpPr>
+          <p:cNvPr id="3" name="Content Placeholder 2"/>
+          <p:cNvSpPr>
+            <a:spLocks noGrp="1"/>
+          </p:cNvSpPr>
+          <p:nvPr>
+            <p:ph idx="1"/>
+          </p:nvPr>
+        </p:nvSpPr>
+        <p:spPr/>
+        <p:txBody>
+          <a:bodyPr/>
+          <a:lstStyle/>
+          <a:p>
+            <a:pPr lvl="0"/>
+            <a:r>
+              <a:rPr i="1"/>
+              <a:t>“Not about answers — just questions worth asking… together, without shame”</a:t>
+            </a:r>
+          </a:p>
+          <a:p>
+            <a:pPr lvl="0"/>
+            <a:r>
+              <a:rPr b="1"/>
+              <a:t>Next Step</a:t>
+            </a:r>
+            <a:r>
+              <a:rPr/>
+              <a:t>: Try one small experiment, share results</a:t>
+            </a:r>
+          </a:p>
+          <a:p>
+            <a:pPr lvl="0"/>
+            <a:r>
+              <a:rPr i="1"/>
+              <a:t>“The best way to predict the future is to help create it”</a:t>
+            </a:r>
+          </a:p>
+        </p:txBody>
+      </p:sp>
+    </p:spTree>
+  </p:cSld>
+</p:sld>
+</file>
+
+<file path=ppt/slides/slide15.xml><?xml version="1.0" encoding="utf-8"?>
+<p:sld xmlns:a="http://schemas.openxmlformats.org/drawingml/2006/main" xmlns:r="http://schemas.openxmlformats.org/officeDocument/2006/relationships" xmlns:p="http://schemas.openxmlformats.org/presentationml/2006/main">
+  <p:cSld>
+    <p:spTree>
+      <p:nvGrpSpPr>
+        <p:cNvPr id="1" name=""/>
+        <p:cNvGrpSpPr/>
+        <p:nvPr/>
+      </p:nvGrpSpPr>
+      <p:grpSpPr>
+        <a:xfrm>
+          <a:off x="0" y="0"/>
+          <a:ext cx="0" cy="0"/>
+          <a:chOff x="0" y="0"/>
+          <a:chExt cx="0" cy="0"/>
+        </a:xfrm>
+      </p:grpSpPr>
+      <p:sp>
+        <p:nvSpPr>
+          <p:cNvPr id="2" name="Title 1"/>
+          <p:cNvSpPr>
+            <a:spLocks noGrp="1"/>
+          </p:cNvSpPr>
+          <p:nvPr>
+            <p:ph type="title"/>
+          </p:nvPr>
+        </p:nvSpPr>
+        <p:spPr/>
+        <p:txBody>
+          <a:bodyPr/>
+          <a:lstStyle/>
+          <a:p>
+            <a:pPr lvl="0" indent="0" marL="0">
+              <a:buNone/>
+            </a:pPr>
+            <a:r>
+              <a:rPr/>
               <a:t>Resources &amp; References</a:t>
             </a:r>
           </a:p>
@@ -6119,75 +6216,83 @@
             <p:ph type="title"/>
           </p:nvPr>
         </p:nvSpPr>
-        <p:spPr/>
-        <p:txBody>
-          <a:bodyPr/>
-          <a:lstStyle/>
-          <a:p>
-            <a:pPr lvl="0" indent="0" marL="0">
-              <a:buNone/>
-            </a:pPr>
-            <a:r>
-              <a:rPr/>
-              <a:t>Framing the Conversation</a:t>
-            </a:r>
-          </a:p>
-        </p:txBody>
-      </p:sp>
-      <p:sp>
-        <p:nvSpPr>
-          <p:cNvPr id="3" name="Content Placeholder 2"/>
-          <p:cNvSpPr>
-            <a:spLocks noGrp="1"/>
-          </p:cNvSpPr>
-          <p:nvPr>
-            <p:ph idx="1"/>
-          </p:nvPr>
-        </p:nvSpPr>
-        <p:spPr/>
-        <p:txBody>
-          <a:bodyPr/>
-          <a:lstStyle/>
-          <a:p>
-            <a:pPr lvl="0"/>
-            <a:r>
-              <a:rPr b="1"/>
-              <a:t>Reality Check</a:t>
-            </a:r>
-            <a:r>
-              <a:rPr/>
-              <a:t>: AI already in workflows; disciplines differ; no one-size-fits-all</a:t>
-            </a:r>
-          </a:p>
-          <a:p>
-            <a:pPr lvl="0"/>
-            <a:r>
-              <a:rPr b="1"/>
-              <a:t>Today’s Goal</a:t>
-            </a:r>
-            <a:r>
-              <a:rPr/>
-              <a:t>: Share challenges &amp; spark reflection</a:t>
-            </a:r>
-          </a:p>
-          <a:p>
-            <a:pPr lvl="0"/>
-            <a:r>
-              <a:rPr i="1"/>
-              <a:t>“Not about answers — just questions worth asking”</a:t>
-            </a:r>
-          </a:p>
-          <a:p>
-            <a:pPr lvl="0" indent="0" marL="0">
-              <a:buNone/>
-            </a:pPr>
-            <a:r>
-              <a:rPr i="1"/>
-              <a:t>AI Acknowledgment: AI tools were used in the initial drafting and development of this document. All content has been reviewed, refined, and validated through human expertise and professional judgment.</a:t>
-            </a:r>
-          </a:p>
-        </p:txBody>
-      </p:sp>
+        <p:spPr>
+          <a:xfrm>
+            <a:off x="457201" y="204787"/>
+            <a:ext cx="3008313" cy="871538"/>
+          </a:xfrm>
+        </p:spPr>
+        <p:txBody>
+          <a:bodyPr/>
+          <a:lstStyle/>
+          <a:p>
+            <a:pPr lvl="0" indent="0" marL="0">
+              <a:buNone/>
+            </a:pPr>
+            <a:r>
+              <a:rPr/>
+              <a:t>Companion Website</a:t>
+            </a:r>
+          </a:p>
+        </p:txBody>
+      </p:sp>
+      <p:sp>
+        <p:nvSpPr>
+          <p:cNvPr id="4" name="Text Placeholder 3"/>
+          <p:cNvSpPr>
+            <a:spLocks noGrp="1"/>
+          </p:cNvSpPr>
+          <p:nvPr>
+            <p:ph idx="2" sz="half" type="body"/>
+          </p:nvPr>
+        </p:nvSpPr>
+        <p:spPr/>
+        <p:txBody>
+          <a:bodyPr/>
+          <a:lstStyle/>
+          <a:p>
+            <a:pPr lvl="0" indent="0" marL="0">
+              <a:buNone/>
+            </a:pPr>
+            <a:r>
+              <a:rPr>
+                <a:hlinkClick r:id="rId2"/>
+              </a:rPr>
+              <a:t>AI in the Curriculum</a:t>
+            </a:r>
+          </a:p>
+        </p:txBody>
+      </p:sp>
+      <p:pic>
+        <p:nvPicPr>
+          <p:cNvPr descr="./ai_in_curriculum_qr.png" id="0" name="Picture 1"/>
+          <p:cNvPicPr>
+            <a:picLocks noGrp="1" noChangeAspect="1"/>
+          </p:cNvPicPr>
+          <p:nvPr/>
+        </p:nvPicPr>
+        <p:blipFill>
+          <a:blip r:embed="rId3"/>
+          <a:stretch>
+            <a:fillRect/>
+          </a:stretch>
+        </p:blipFill>
+        <p:spPr bwMode="auto">
+          <a:xfrm>
+            <a:off x="3937000" y="203200"/>
+            <a:ext cx="4381500" cy="4381500"/>
+          </a:xfrm>
+          <a:prstGeom prst="rect">
+            <a:avLst/>
+          </a:prstGeom>
+          <a:noFill/>
+          <a:ln w="9525">
+            <a:noFill/>
+            <a:headEnd/>
+            <a:tailEnd/>
+          </a:ln>
+        </p:spPr>
+      </p:pic>
     </p:spTree>
   </p:cSld>
 </p:sld>
@@ -6230,7 +6335,7 @@
             </a:pPr>
             <a:r>
               <a:rPr/>
-              <a:t>Over-Trust: The “Fountain of Knowledge” Problem</a:t>
+              <a:t>Framing the Conversation</a:t>
             </a:r>
           </a:p>
         </p:txBody>
@@ -6253,34 +6358,38 @@
             <a:pPr lvl="0"/>
             <a:r>
               <a:rPr b="1"/>
-              <a:t>Challenge</a:t>
-            </a:r>
-            <a:r>
-              <a:rPr/>
-              <a:t>: Students over-trust AI</a:t>
+              <a:t>Reality Check</a:t>
+            </a:r>
+            <a:r>
+              <a:rPr/>
+              <a:t>: AI already in workflows; disciplines differ; no one-size-fits-all</a:t>
             </a:r>
           </a:p>
           <a:p>
             <a:pPr lvl="0"/>
             <a:r>
               <a:rPr b="1"/>
-              <a:t>Impact</a:t>
-            </a:r>
-            <a:r>
-              <a:rPr/>
-              <a:t>: Weakens critical thinking</a:t>
-            </a:r>
-            <a:br/>
-          </a:p>
-          <a:p>
-            <a:pPr lvl="0"/>
-            <a:r>
-              <a:rPr b="1"/>
-              <a:t>Response</a:t>
-            </a:r>
-            <a:r>
-              <a:rPr/>
-              <a:t>: Error-spotting, critique, reward questioning</a:t>
+              <a:t>Today’s Goal</a:t>
+            </a:r>
+            <a:r>
+              <a:rPr/>
+              <a:t>: Share challenges &amp; spark reflection</a:t>
+            </a:r>
+          </a:p>
+          <a:p>
+            <a:pPr lvl="0"/>
+            <a:r>
+              <a:rPr i="1"/>
+              <a:t>“Not about answers — just questions worth asking”</a:t>
+            </a:r>
+          </a:p>
+          <a:p>
+            <a:pPr lvl="0" indent="0" marL="0">
+              <a:buNone/>
+            </a:pPr>
+            <a:r>
+              <a:rPr i="1"/>
+              <a:t>AI Acknowledgment: AI tools were used in the initial drafting and development of this document. All content has been reviewed, refined, and validated through human expertise and professional judgment.</a:t>
             </a:r>
           </a:p>
         </p:txBody>
@@ -6291,6 +6400,103 @@
 </file>
 
 <file path=ppt/slides/slide4.xml><?xml version="1.0" encoding="utf-8"?>
+<p:sld xmlns:a="http://schemas.openxmlformats.org/drawingml/2006/main" xmlns:r="http://schemas.openxmlformats.org/officeDocument/2006/relationships" xmlns:p="http://schemas.openxmlformats.org/presentationml/2006/main">
+  <p:cSld>
+    <p:spTree>
+      <p:nvGrpSpPr>
+        <p:cNvPr id="1" name=""/>
+        <p:cNvGrpSpPr/>
+        <p:nvPr/>
+      </p:nvGrpSpPr>
+      <p:grpSpPr>
+        <a:xfrm>
+          <a:off x="0" y="0"/>
+          <a:ext cx="0" cy="0"/>
+          <a:chOff x="0" y="0"/>
+          <a:chExt cx="0" cy="0"/>
+        </a:xfrm>
+      </p:grpSpPr>
+      <p:sp>
+        <p:nvSpPr>
+          <p:cNvPr id="2" name="Title 1"/>
+          <p:cNvSpPr>
+            <a:spLocks noGrp="1"/>
+          </p:cNvSpPr>
+          <p:nvPr>
+            <p:ph type="title"/>
+          </p:nvPr>
+        </p:nvSpPr>
+        <p:spPr/>
+        <p:txBody>
+          <a:bodyPr/>
+          <a:lstStyle/>
+          <a:p>
+            <a:pPr lvl="0" indent="0" marL="0">
+              <a:buNone/>
+            </a:pPr>
+            <a:r>
+              <a:rPr/>
+              <a:t>Over-Trust: The “Fountain of Knowledge” Problem</a:t>
+            </a:r>
+          </a:p>
+        </p:txBody>
+      </p:sp>
+      <p:sp>
+        <p:nvSpPr>
+          <p:cNvPr id="3" name="Content Placeholder 2"/>
+          <p:cNvSpPr>
+            <a:spLocks noGrp="1"/>
+          </p:cNvSpPr>
+          <p:nvPr>
+            <p:ph idx="1"/>
+          </p:nvPr>
+        </p:nvSpPr>
+        <p:spPr/>
+        <p:txBody>
+          <a:bodyPr/>
+          <a:lstStyle/>
+          <a:p>
+            <a:pPr lvl="0"/>
+            <a:r>
+              <a:rPr b="1"/>
+              <a:t>Challenge</a:t>
+            </a:r>
+            <a:r>
+              <a:rPr/>
+              <a:t>: Students over-trust AI</a:t>
+            </a:r>
+          </a:p>
+          <a:p>
+            <a:pPr lvl="0"/>
+            <a:r>
+              <a:rPr b="1"/>
+              <a:t>Impact</a:t>
+            </a:r>
+            <a:r>
+              <a:rPr/>
+              <a:t>: Weakens critical thinking</a:t>
+            </a:r>
+            <a:br/>
+          </a:p>
+          <a:p>
+            <a:pPr lvl="0"/>
+            <a:r>
+              <a:rPr b="1"/>
+              <a:t>Response</a:t>
+            </a:r>
+            <a:r>
+              <a:rPr/>
+              <a:t>: Error-spotting, critique, reward questioning</a:t>
+            </a:r>
+          </a:p>
+        </p:txBody>
+      </p:sp>
+    </p:spTree>
+  </p:cSld>
+</p:sld>
+</file>
+
+<file path=ppt/slides/slide5.xml><?xml version="1.0" encoding="utf-8"?>
 <p:sld xmlns:a="http://schemas.openxmlformats.org/drawingml/2006/main" xmlns:r="http://schemas.openxmlformats.org/officeDocument/2006/relationships" xmlns:p="http://schemas.openxmlformats.org/presentationml/2006/main">
   <p:cSld>
     <p:spTree>
@@ -6446,105 +6652,6 @@
 </p:sld>
 </file>
 
-<file path=ppt/slides/slide5.xml><?xml version="1.0" encoding="utf-8"?>
-<p:sld xmlns:a="http://schemas.openxmlformats.org/drawingml/2006/main" xmlns:r="http://schemas.openxmlformats.org/officeDocument/2006/relationships" xmlns:p="http://schemas.openxmlformats.org/presentationml/2006/main">
-  <p:cSld>
-    <p:spTree>
-      <p:nvGrpSpPr>
-        <p:cNvPr id="1" name=""/>
-        <p:cNvGrpSpPr/>
-        <p:nvPr/>
-      </p:nvGrpSpPr>
-      <p:grpSpPr>
-        <a:xfrm>
-          <a:off x="0" y="0"/>
-          <a:ext cx="0" cy="0"/>
-          <a:chOff x="0" y="0"/>
-          <a:chExt cx="0" cy="0"/>
-        </a:xfrm>
-      </p:grpSpPr>
-      <p:sp>
-        <p:nvSpPr>
-          <p:cNvPr id="2" name="Title 1"/>
-          <p:cNvSpPr>
-            <a:spLocks noGrp="1"/>
-          </p:cNvSpPr>
-          <p:nvPr>
-            <p:ph type="title"/>
-          </p:nvPr>
-        </p:nvSpPr>
-        <p:spPr/>
-        <p:txBody>
-          <a:bodyPr/>
-          <a:lstStyle/>
-          <a:p>
-            <a:pPr lvl="0" indent="0" marL="0">
-              <a:buNone/>
-            </a:pPr>
-            <a:r>
-              <a:rPr/>
-              <a:t>Misplaced Blame: It’s Not the Tool</a:t>
-            </a:r>
-          </a:p>
-        </p:txBody>
-      </p:sp>
-      <p:sp>
-        <p:nvSpPr>
-          <p:cNvPr id="3" name="Content Placeholder 2"/>
-          <p:cNvSpPr>
-            <a:spLocks noGrp="1"/>
-          </p:cNvSpPr>
-          <p:nvPr>
-            <p:ph idx="1"/>
-          </p:nvPr>
-        </p:nvSpPr>
-        <p:spPr/>
-        <p:txBody>
-          <a:bodyPr/>
-          <a:lstStyle/>
-          <a:p>
-            <a:pPr lvl="0"/>
-            <a:r>
-              <a:rPr b="1"/>
-              <a:t>Challenge</a:t>
-            </a:r>
-            <a:r>
-              <a:rPr/>
-              <a:t>: Staff blame AI for integrity issues</a:t>
-            </a:r>
-          </a:p>
-          <a:p>
-            <a:pPr lvl="0"/>
-            <a:r>
-              <a:rPr b="1"/>
-              <a:t>Response</a:t>
-            </a:r>
-            <a:r>
-              <a:rPr/>
-              <a:t>: Adapt assessment, don’t ban</a:t>
-            </a:r>
-          </a:p>
-          <a:p>
-            <a:pPr lvl="1"/>
-            <a:r>
-              <a:rPr/>
-              <a:t>Authentic, Personalised, Reflective</a:t>
-            </a:r>
-          </a:p>
-          <a:p>
-            <a:pPr lvl="0"/>
-            <a:r>
-              <a:rPr i="1"/>
-              <a:t>Past tools changed assessment, AI will too</a:t>
-            </a:r>
-          </a:p>
-        </p:txBody>
-      </p:sp>
-    </p:spTree>
-  </p:cSld>
-</p:sld>
-</file>
-
 <file path=ppt/slides/slide6.xml><?xml version="1.0" encoding="utf-8"?>
 <p:sld xmlns:a="http://schemas.openxmlformats.org/drawingml/2006/main" xmlns:r="http://schemas.openxmlformats.org/officeDocument/2006/relationships" xmlns:p="http://schemas.openxmlformats.org/presentationml/2006/main">
   <p:cSld>
@@ -6582,7 +6689,7 @@
             </a:pPr>
             <a:r>
               <a:rPr/>
-              <a:t>Fear of AI: The Root of Resistance</a:t>
+              <a:t>Misplaced Blame: It’s Not the Tool</a:t>
             </a:r>
           </a:p>
         </p:txBody>
@@ -6605,54 +6712,36 @@
             <a:pPr lvl="0"/>
             <a:r>
               <a:rPr b="1"/>
-              <a:t>The Fear</a:t>
-            </a:r>
-            <a:r>
-              <a:rPr/>
-              <a:t>: “AI will replace me” | “I’ll become obsolete” | “My expertise won’t matter”</a:t>
+              <a:t>Challenge</a:t>
+            </a:r>
+            <a:r>
+              <a:rPr/>
+              <a:t>: Staff blame AI for integrity issues</a:t>
             </a:r>
           </a:p>
           <a:p>
             <a:pPr lvl="0"/>
             <a:r>
               <a:rPr b="1"/>
-              <a:t>The Reality</a:t>
-            </a:r>
-            <a:r>
-              <a:rPr/>
-              <a:t>: Every new tool sparked fear</a:t>
+              <a:t>Response</a:t>
+            </a:r>
+            <a:r>
+              <a:rPr/>
+              <a:t>: Adapt assessment, don’t ban</a:t>
             </a:r>
           </a:p>
           <a:p>
             <a:pPr lvl="1"/>
             <a:r>
               <a:rPr/>
-              <a:t>Printing press → scribes worried</a:t>
-            </a:r>
-          </a:p>
-          <a:p>
-            <a:pPr lvl="1"/>
-            <a:r>
-              <a:rPr/>
-              <a:t>Calculators → mathematicians concerned</a:t>
-            </a:r>
-          </a:p>
-          <a:p>
-            <a:pPr lvl="1"/>
-            <a:r>
-              <a:rPr/>
-              <a:t>Internet → everyone panicked</a:t>
-            </a:r>
-          </a:p>
-          <a:p>
-            <a:pPr lvl="0"/>
-            <a:r>
-              <a:rPr b="1"/>
-              <a:t>The Pattern</a:t>
-            </a:r>
-            <a:r>
-              <a:rPr/>
-              <a:t>: Those who adapted thrived</a:t>
+              <a:t>Authentic, Personalised, Reflective</a:t>
+            </a:r>
+          </a:p>
+          <a:p>
+            <a:pPr lvl="0"/>
+            <a:r>
+              <a:rPr i="1"/>
+              <a:t>Past tools changed assessment, AI will too</a:t>
             </a:r>
           </a:p>
         </p:txBody>
@@ -6699,7 +6788,7 @@
             </a:pPr>
             <a:r>
               <a:rPr/>
-              <a:t>AI Shame: The Hidden Barrier</a:t>
+              <a:t>Fear of AI: The Root of Resistance</a:t>
             </a:r>
           </a:p>
         </p:txBody>
@@ -6722,33 +6811,54 @@
             <a:pPr lvl="0"/>
             <a:r>
               <a:rPr b="1"/>
-              <a:t>Challenge</a:t>
-            </a:r>
-            <a:r>
-              <a:rPr/>
-              <a:t>: Students &amp; staff feel guilt/cheating</a:t>
+              <a:t>The Fear</a:t>
+            </a:r>
+            <a:r>
+              <a:rPr/>
+              <a:t>: “AI will replace me” | “I’ll become obsolete” | “My expertise won’t matter”</a:t>
             </a:r>
           </a:p>
           <a:p>
             <a:pPr lvl="0"/>
             <a:r>
               <a:rPr b="1"/>
-              <a:t>Impact</a:t>
-            </a:r>
-            <a:r>
-              <a:rPr/>
-              <a:t>: Underground use, stress, lost learning</a:t>
+              <a:t>The Reality</a:t>
+            </a:r>
+            <a:r>
+              <a:rPr/>
+              <a:t>: Every new tool sparked fear</a:t>
+            </a:r>
+          </a:p>
+          <a:p>
+            <a:pPr lvl="1"/>
+            <a:r>
+              <a:rPr/>
+              <a:t>Printing press → scribes worried</a:t>
+            </a:r>
+          </a:p>
+          <a:p>
+            <a:pPr lvl="1"/>
+            <a:r>
+              <a:rPr/>
+              <a:t>Calculators → mathematicians concerned</a:t>
+            </a:r>
+          </a:p>
+          <a:p>
+            <a:pPr lvl="1"/>
+            <a:r>
+              <a:rPr/>
+              <a:t>Internet → everyone panicked</a:t>
             </a:r>
           </a:p>
           <a:p>
             <a:pPr lvl="0"/>
             <a:r>
               <a:rPr b="1"/>
-              <a:t>Response</a:t>
-            </a:r>
-            <a:r>
-              <a:rPr/>
-              <a:t>: Normalise, Teach process, Share examples</a:t>
+              <a:t>The Pattern</a:t>
+            </a:r>
+            <a:r>
+              <a:rPr/>
+              <a:t>: Those who adapted thrived</a:t>
             </a:r>
           </a:p>
         </p:txBody>
@@ -6795,7 +6905,7 @@
             </a:pPr>
             <a:r>
               <a:rPr/>
-              <a:t>Three Practical Pathways</a:t>
+              <a:t>AI Shame: The Hidden Barrier</a:t>
             </a:r>
           </a:p>
         </p:txBody>
@@ -6815,42 +6925,36 @@
           <a:bodyPr/>
           <a:lstStyle/>
           <a:p>
-            <a:pPr lvl="0" indent="-342900" marL="342900">
-              <a:buAutoNum type="arabicPeriod"/>
-            </a:pPr>
+            <a:pPr lvl="0"/>
             <a:r>
               <a:rPr b="1"/>
-              <a:t>Learning Assistant</a:t>
-            </a:r>
-            <a:r>
-              <a:rPr/>
-              <a:t>: Brainstorm, counter-arguments, debugging</a:t>
-            </a:r>
-          </a:p>
-          <a:p>
-            <a:pPr lvl="0" indent="-342900" marL="342900">
-              <a:buAutoNum type="arabicPeriod"/>
-            </a:pPr>
+              <a:t>Challenge</a:t>
+            </a:r>
+            <a:r>
+              <a:rPr/>
+              <a:t>: Students &amp; staff feel guilt/cheating</a:t>
+            </a:r>
+          </a:p>
+          <a:p>
+            <a:pPr lvl="0"/>
             <a:r>
               <a:rPr b="1"/>
-              <a:t>Teaching Partner</a:t>
-            </a:r>
-            <a:r>
-              <a:rPr/>
-              <a:t>: Practice problems, draft feedback, adaptive tasks</a:t>
-            </a:r>
-          </a:p>
-          <a:p>
-            <a:pPr lvl="0" indent="-342900" marL="342900">
-              <a:buAutoNum type="arabicPeriod"/>
-            </a:pPr>
+              <a:t>Impact</a:t>
+            </a:r>
+            <a:r>
+              <a:rPr/>
+              <a:t>: Underground use, stress, lost learning</a:t>
+            </a:r>
+          </a:p>
+          <a:p>
+            <a:pPr lvl="0"/>
             <a:r>
               <a:rPr b="1"/>
-              <a:t>Discipline Tool</a:t>
-            </a:r>
-            <a:r>
-              <a:rPr/>
-              <a:t>: Engineering, Business, Health, Arts</a:t>
+              <a:t>Response</a:t>
+            </a:r>
+            <a:r>
+              <a:rPr/>
+              <a:t>: Normalise, Teach process, Share examples</a:t>
             </a:r>
           </a:p>
         </p:txBody>
@@ -6897,7 +7001,7 @@
             </a:pPr>
             <a:r>
               <a:rPr/>
-              <a:t>Quick Win: 30-Minute Experiment</a:t>
+              <a:t>Three Practical Pathways</a:t>
             </a:r>
           </a:p>
         </p:txBody>
@@ -6917,36 +7021,42 @@
           <a:bodyPr/>
           <a:lstStyle/>
           <a:p>
-            <a:pPr lvl="0"/>
+            <a:pPr lvl="0" indent="-342900" marL="342900">
+              <a:buAutoNum type="arabicPeriod"/>
+            </a:pPr>
             <a:r>
               <a:rPr b="1"/>
-              <a:t>What</a:t>
-            </a:r>
-            <a:r>
-              <a:rPr/>
-              <a:t>: Worksheet → HTML in 30 min</a:t>
-            </a:r>
-          </a:p>
-          <a:p>
-            <a:pPr lvl="0"/>
+              <a:t>Learning Assistant</a:t>
+            </a:r>
+            <a:r>
+              <a:rPr/>
+              <a:t>: Brainstorm, counter-arguments, debugging</a:t>
+            </a:r>
+          </a:p>
+          <a:p>
+            <a:pPr lvl="0" indent="-342900" marL="342900">
+              <a:buAutoNum type="arabicPeriod"/>
+            </a:pPr>
             <a:r>
               <a:rPr b="1"/>
-              <a:t>Result</a:t>
-            </a:r>
-            <a:r>
-              <a:rPr/>
-              <a:t>: Upload both verisons, more engagement</a:t>
-            </a:r>
-          </a:p>
-          <a:p>
-            <a:pPr lvl="0"/>
+              <a:t>Teaching Partner</a:t>
+            </a:r>
+            <a:r>
+              <a:rPr/>
+              <a:t>: Practice problems, draft feedback, adaptive tasks</a:t>
+            </a:r>
+          </a:p>
+          <a:p>
+            <a:pPr lvl="0" indent="-342900" marL="342900">
+              <a:buAutoNum type="arabicPeriod"/>
+            </a:pPr>
             <a:r>
               <a:rPr b="1"/>
-              <a:t>Key Insight</a:t>
-            </a:r>
-            <a:r>
-              <a:rPr/>
-              <a:t>: Options, not replacements</a:t>
+              <a:t>Discipline Tool</a:t>
+            </a:r>
+            <a:r>
+              <a:rPr/>
+              <a:t>: Engineering, Business, Health, Arts</a:t>
             </a:r>
           </a:p>
         </p:txBody>

</xml_diff>

<commit_message>
Updated AI roles in teaching
</commit_message>
<xml_diff>
--- a/cl-ai-in-the-curriculum.pptx
+++ b/cl-ai-in-the-curriculum.pptx
@@ -5,7 +5,7 @@
     <p:sldMasterId id="2147483648" r:id="rId1"/>
   </p:sldMasterIdLst>
   <p:notesMasterIdLst>
-    <p:notesMasterId r:id="rId17"/>
+    <p:notesMasterId r:id="rId19"/>
   </p:notesMasterIdLst>
   <p:sldIdLst>
     <p:sldId id="256" r:id="rId2"/>
@@ -23,6 +23,8 @@
     <p:sldId id="268" r:id="rId14"/>
     <p:sldId id="269" r:id="rId15"/>
     <p:sldId id="270" r:id="rId16"/>
+    <p:sldId id="271" r:id="rId17"/>
+    <p:sldId id="272" r:id="rId18"/>
   </p:sldIdLst>
   <p:sldSz cx="9144000" cy="5143500" type="screen16x9"/>
   <p:notesSz cx="6858000" cy="9144000"/>
@@ -538,7 +540,27 @@
             </a:pPr>
             <a:r>
               <a:rPr/>
-              <a:t>I’m sharing observations from my own teaching and conversations with colleagues - you’ll likely recognize these patterns.</a:t>
+              <a:t>I’m sharing observations from my own teaching and conversations with colleagues - you’ll likely recognize these patterns. * </a:t>
+            </a:r>
+            <a:r>
+              <a:rPr b="1"/>
+              <a:t>Reality Check</a:t>
+            </a:r>
+            <a:r>
+              <a:rPr/>
+              <a:t>: AI already in workflows; disciplines differ; no one-size-fits-all * </a:t>
+            </a:r>
+            <a:r>
+              <a:rPr b="1"/>
+              <a:t>Today’s Goal</a:t>
+            </a:r>
+            <a:r>
+              <a:rPr/>
+              <a:t>: Share challenges &amp; spark reflection * </a:t>
+            </a:r>
+            <a:r>
+              <a:rPr i="1"/>
+              <a:t>“Not about answers — just questions worth asking”</a:t>
             </a:r>
           </a:p>
           <a:p>
@@ -654,7 +676,7 @@
           <a:p>
             <a:fld id="{18BDFEC3-8487-43E8-A154-7C12CBC1FFF2}" type="slidenum">
               <a:rPr lang="en-US"/>
-              <a:t>3</a:t>
+              <a:t>4</a:t>
             </a:fld>
             <a:endParaRPr lang="en-US"/>
           </a:p>
@@ -826,7 +848,7 @@
           <a:p>
             <a:fld id="{18BDFEC3-8487-43E8-A154-7C12CBC1FFF2}" type="slidenum">
               <a:rPr lang="en-US"/>
-              <a:t>12</a:t>
+              <a:t>14</a:t>
             </a:fld>
             <a:endParaRPr lang="en-US"/>
           </a:p>
@@ -968,7 +990,7 @@
           <a:p>
             <a:fld id="{18BDFEC3-8487-43E8-A154-7C12CBC1FFF2}" type="slidenum">
               <a:rPr lang="en-US"/>
-              <a:t>13</a:t>
+              <a:t>15</a:t>
             </a:fld>
             <a:endParaRPr lang="en-US"/>
           </a:p>
@@ -1108,7 +1130,7 @@
           <a:p>
             <a:fld id="{18BDFEC3-8487-43E8-A154-7C12CBC1FFF2}" type="slidenum">
               <a:rPr lang="en-US"/>
-              <a:t>14</a:t>
+              <a:t>16</a:t>
             </a:fld>
             <a:endParaRPr lang="en-US"/>
           </a:p>
@@ -1312,7 +1334,7 @@
           <a:p>
             <a:fld id="{18BDFEC3-8487-43E8-A154-7C12CBC1FFF2}" type="slidenum">
               <a:rPr lang="en-US"/>
-              <a:t>4</a:t>
+              <a:t>5</a:t>
             </a:fld>
             <a:endParaRPr lang="en-US"/>
           </a:p>
@@ -1510,7 +1532,7 @@
           <a:p>
             <a:fld id="{18BDFEC3-8487-43E8-A154-7C12CBC1FFF2}" type="slidenum">
               <a:rPr lang="en-US"/>
-              <a:t>5</a:t>
+              <a:t>6</a:t>
             </a:fld>
             <a:endParaRPr lang="en-US"/>
           </a:p>
@@ -1660,7 +1682,7 @@
           <a:p>
             <a:fld id="{18BDFEC3-8487-43E8-A154-7C12CBC1FFF2}" type="slidenum">
               <a:rPr lang="en-US"/>
-              <a:t>6</a:t>
+              <a:t>7</a:t>
             </a:fld>
             <a:endParaRPr lang="en-US"/>
           </a:p>
@@ -1806,7 +1828,7 @@
           <a:p>
             <a:fld id="{18BDFEC3-8487-43E8-A154-7C12CBC1FFF2}" type="slidenum">
               <a:rPr lang="en-US"/>
-              <a:t>7</a:t>
+              <a:t>8</a:t>
             </a:fld>
             <a:endParaRPr lang="en-US"/>
           </a:p>
@@ -2010,7 +2032,7 @@
           <a:p>
             <a:fld id="{18BDFEC3-8487-43E8-A154-7C12CBC1FFF2}" type="slidenum">
               <a:rPr lang="en-US"/>
-              <a:t>8</a:t>
+              <a:t>9</a:t>
             </a:fld>
             <a:endParaRPr lang="en-US"/>
           </a:p>
@@ -2069,12 +2091,180 @@
               <a:buNone/>
             </a:pPr>
             <a:r>
+              <a:rPr/>
+              <a:t>So how do we move to productive use? UNESCO’s research identifies multiple roles AI can play in education - not as replacement, but as partner.”</a:t>
+            </a:r>
+          </a:p>
+          <a:p>
+            <a:pPr lvl="0" indent="0" marL="0">
+              <a:buNone/>
+            </a:pPr>
+          </a:p>
+          <a:p>
+            <a:pPr lvl="0" indent="0" marL="0">
+              <a:buNone/>
+            </a:pPr>
+            <a:r>
               <a:rPr b="1"/>
-              <a:t>Frame positively</a:t>
-            </a:r>
-            <a:r>
-              <a:rPr/>
-              <a:t>: “These aren’t replacements - they’re enhancements”</a:t>
+              <a:t>Walk through key roles</a:t>
+            </a:r>
+            <a:r>
+              <a:rPr/>
+              <a:t> (pick 3-4 based on time):</a:t>
+            </a:r>
+          </a:p>
+          <a:p>
+            <a:pPr lvl="0" indent="0" marL="0">
+              <a:buNone/>
+            </a:pPr>
+          </a:p>
+          <a:p>
+            <a:pPr lvl="0" indent="0" marL="0">
+              <a:buNone/>
+            </a:pPr>
+            <a:r>
+              <a:rPr b="1"/>
+              <a:t>Possibility Engine example</a:t>
+            </a:r>
+            <a:r>
+              <a:rPr/>
+              <a:t>: “Students use ChatGPT to brainstorm essay topics. One student was stuck on a history assignment until AI helped generate 10 different angles - they chose one they’d never considered.”</a:t>
+            </a:r>
+          </a:p>
+          <a:p>
+            <a:pPr lvl="0" indent="0" marL="0">
+              <a:buNone/>
+            </a:pPr>
+          </a:p>
+          <a:p>
+            <a:pPr lvl="0" indent="0" marL="0">
+              <a:buNone/>
+            </a:pPr>
+            <a:r>
+              <a:rPr b="1"/>
+              <a:t>Socratic Opponent</a:t>
+            </a:r>
+            <a:r>
+              <a:rPr/>
+              <a:t>: “In my business ethics class, students argue one position while ChatGPT argues the opposite. Forces them to strengthen their reasoning - can’t just say ‘because I think so.’”</a:t>
+            </a:r>
+          </a:p>
+          <a:p>
+            <a:pPr lvl="0" indent="0" marL="0">
+              <a:buNone/>
+            </a:pPr>
+          </a:p>
+          <a:p>
+            <a:pPr lvl="0" indent="0" marL="0">
+              <a:buNone/>
+            </a:pPr>
+            <a:r>
+              <a:rPr b="1"/>
+              <a:t>Personal Tutor</a:t>
+            </a:r>
+            <a:r>
+              <a:rPr/>
+              <a:t> (relate to shame): “This addresses the shame issue directly - students can ask AI ‘dumb questions’ they’re embarrassed to ask in class. No judgment, infinite patience.”</a:t>
+            </a:r>
+          </a:p>
+          <a:p>
+            <a:pPr lvl="0" indent="0" marL="0">
+              <a:buNone/>
+            </a:pPr>
+          </a:p>
+          <a:p>
+            <a:pPr lvl="0" indent="0" marL="0">
+              <a:buNone/>
+            </a:pPr>
+            <a:r>
+              <a:rPr b="1"/>
+              <a:t>Study Buddy</a:t>
+            </a:r>
+            <a:r>
+              <a:rPr/>
+              <a:t>: “Perfect for exam prep. Students explain concepts TO the AI - if they can’t explain it clearly, they don’t understand it yet.”</a:t>
+            </a:r>
+          </a:p>
+          <a:p>
+            <a:pPr lvl="0" indent="0" marL="0">
+              <a:buNone/>
+            </a:pPr>
+          </a:p>
+          <a:p>
+            <a:pPr lvl="0" indent="0" marL="0">
+              <a:buNone/>
+            </a:pPr>
+            <a:r>
+              <a:rPr b="1"/>
+              <a:t>Key message</a:t>
+            </a:r>
+            <a:r>
+              <a:rPr/>
+              <a:t>: “Notice none of these replace YOU. They augment learning. AI handles repetitive tasks so you can focus on what only humans do - inspire, connect, judge quality, provide wisdom.”</a:t>
+            </a:r>
+          </a:p>
+          <a:p>
+            <a:pPr lvl="0" indent="0" marL="0">
+              <a:buNone/>
+            </a:pPr>
+          </a:p>
+          <a:p>
+            <a:pPr lvl="0" indent="0" marL="0">
+              <a:buNone/>
+            </a:pPr>
+            <a:r>
+              <a:rPr b="1"/>
+              <a:t>Address elephant</a:t>
+            </a:r>
+            <a:r>
+              <a:rPr/>
+              <a:t>: “Some of you might be thinking ‘but students will cheat.’ Remember - it’s not about the tool, it’s about the task design. If AI can complete your assignment alone, the assignment needs redesigning.”</a:t>
+            </a:r>
+          </a:p>
+          <a:p>
+            <a:pPr lvl="0" indent="0" marL="0">
+              <a:buNone/>
+            </a:pPr>
+          </a:p>
+          <a:p>
+            <a:pPr lvl="0" indent="0" marL="0">
+              <a:buNone/>
+            </a:pPr>
+            <a:r>
+              <a:rPr b="1"/>
+              <a:t>Practical takeaway</a:t>
+            </a:r>
+            <a:r>
+              <a:rPr/>
+              <a:t>: “Pick ONE role from this table. Try it next week. Start small.”</a:t>
+            </a:r>
+          </a:p>
+          <a:p>
+            <a:pPr lvl="0" indent="0" marL="0">
+              <a:buNone/>
+            </a:pPr>
+          </a:p>
+          <a:p>
+            <a:pPr lvl="0" indent="0" marL="0">
+              <a:buNone/>
+            </a:pPr>
+            <a:r>
+              <a:rPr/>
+              <a:t>“Let me show you how one colleague did exactly that…”</a:t>
+            </a:r>
+          </a:p>
+          <a:p>
+            <a:pPr lvl="0" indent="0" marL="0">
+              <a:buNone/>
+            </a:pPr>
+          </a:p>
+          <a:p>
+            <a:pPr lvl="0" indent="0" marL="0">
+              <a:buNone/>
+            </a:pPr>
+            <a:r>
+              <a:rPr/>
+              <a:t>“These aren’t replacements - they’re enhancements”</a:t>
             </a:r>
           </a:p>
           <a:p>
@@ -2196,7 +2386,7 @@
           <a:p>
             <a:fld id="{18BDFEC3-8487-43E8-A154-7C12CBC1FFF2}" type="slidenum">
               <a:rPr lang="en-US"/>
-              <a:t>9</a:t>
+              <a:t>11</a:t>
             </a:fld>
             <a:endParaRPr lang="en-US"/>
           </a:p>
@@ -2368,7 +2558,7 @@
           <a:p>
             <a:fld id="{18BDFEC3-8487-43E8-A154-7C12CBC1FFF2}" type="slidenum">
               <a:rPr lang="en-US"/>
-              <a:t>10</a:t>
+              <a:t>12</a:t>
             </a:fld>
             <a:endParaRPr lang="en-US"/>
           </a:p>
@@ -2554,7 +2744,7 @@
           <a:p>
             <a:fld id="{18BDFEC3-8487-43E8-A154-7C12CBC1FFF2}" type="slidenum">
               <a:rPr lang="en-US"/>
-              <a:t>11</a:t>
+              <a:t>13</a:t>
             </a:fld>
             <a:endParaRPr lang="en-US"/>
           </a:p>
@@ -5618,31 +5808,6 @@
       </p:grpSpPr>
       <p:sp>
         <p:nvSpPr>
-          <p:cNvPr id="2" name="Title 1"/>
-          <p:cNvSpPr>
-            <a:spLocks noGrp="1"/>
-          </p:cNvSpPr>
-          <p:nvPr>
-            <p:ph type="title"/>
-          </p:nvPr>
-        </p:nvSpPr>
-        <p:spPr/>
-        <p:txBody>
-          <a:bodyPr/>
-          <a:lstStyle/>
-          <a:p>
-            <a:pPr lvl="0" indent="0" marL="0">
-              <a:buNone/>
-            </a:pPr>
-            <a:r>
-              <a:rPr/>
-              <a:t>Quick Win: 30-Minute Experiment</a:t>
-            </a:r>
-          </a:p>
-        </p:txBody>
-      </p:sp>
-      <p:sp>
-        <p:nvSpPr>
           <p:cNvPr id="3" name="Content Placeholder 2"/>
           <p:cNvSpPr>
             <a:spLocks noGrp="1"/>
@@ -5656,36 +5821,12 @@
           <a:bodyPr/>
           <a:lstStyle/>
           <a:p>
-            <a:pPr lvl="0"/>
-            <a:r>
-              <a:rPr b="1"/>
-              <a:t>What</a:t>
-            </a:r>
-            <a:r>
-              <a:rPr/>
-              <a:t>: Worksheet → HTML in 30 min</a:t>
-            </a:r>
-          </a:p>
-          <a:p>
-            <a:pPr lvl="0"/>
-            <a:r>
-              <a:rPr b="1"/>
-              <a:t>Result</a:t>
-            </a:r>
-            <a:r>
-              <a:rPr/>
-              <a:t>: Upload both verisons, more engagement</a:t>
-            </a:r>
-          </a:p>
-          <a:p>
-            <a:pPr lvl="0"/>
-            <a:r>
-              <a:rPr b="1"/>
-              <a:t>Key Insight</a:t>
-            </a:r>
-            <a:r>
-              <a:rPr/>
-              <a:t>: Options, not replacements</a:t>
+            <a:pPr lvl="0" indent="0" marL="0">
+              <a:buNone/>
+            </a:pPr>
+            <a:r>
+              <a:rPr/>
+              <a:t>Here’s the slide content with presenter notes based on the UNESCO framework:</a:t>
             </a:r>
           </a:p>
         </p:txBody>
@@ -5732,56 +5873,67 @@
             </a:pPr>
             <a:r>
               <a:rPr/>
-              <a:t>Showcase: Curriculum Curator (FLX)</a:t>
-            </a:r>
-          </a:p>
-        </p:txBody>
-      </p:sp>
-      <p:sp>
-        <p:nvSpPr>
-          <p:cNvPr id="3" name="Content Placeholder 2"/>
-          <p:cNvSpPr>
-            <a:spLocks noGrp="1"/>
-          </p:cNvSpPr>
-          <p:nvPr>
-            <p:ph idx="1"/>
-          </p:nvPr>
-        </p:nvSpPr>
-        <p:spPr/>
-        <p:txBody>
-          <a:bodyPr/>
-          <a:lstStyle/>
-          <a:p>
-            <a:pPr lvl="0"/>
-            <a:r>
-              <a:rPr b="1"/>
-              <a:t>Tool</a:t>
-            </a:r>
-            <a:r>
-              <a:rPr/>
-              <a:t>: Import → Restructure → Save 80% time</a:t>
-            </a:r>
-          </a:p>
-          <a:p>
-            <a:pPr lvl="0"/>
-            <a:r>
-              <a:rPr b="1"/>
-              <a:t>Value</a:t>
-            </a:r>
-            <a:r>
-              <a:rPr/>
-              <a:t>: Supports staff, not replaces</a:t>
-            </a:r>
-          </a:p>
-          <a:p>
-            <a:pPr lvl="0"/>
-            <a:r>
-              <a:rPr b="1"/>
-              <a:t>Takeaway</a:t>
-            </a:r>
-            <a:r>
-              <a:rPr/>
-              <a:t>: Efficiency</a:t>
+              <a:t>Moving Forward: AI as Learning Partner</a:t>
+            </a:r>
+          </a:p>
+        </p:txBody>
+      </p:sp>
+      <p:pic>
+        <p:nvPicPr>
+          <p:cNvPr descr="./assets/table-use-og-ai.jpeg" id="0" name="Picture 1"/>
+          <p:cNvPicPr>
+            <a:picLocks noGrp="1" noChangeAspect="1"/>
+          </p:cNvPicPr>
+          <p:nvPr/>
+        </p:nvPicPr>
+        <p:blipFill>
+          <a:blip r:embed="rId3"/>
+          <a:stretch>
+            <a:fillRect/>
+          </a:stretch>
+        </p:blipFill>
+        <p:spPr bwMode="auto">
+          <a:xfrm>
+            <a:off x="3048000" y="1193800"/>
+            <a:ext cx="3048000" cy="2882900"/>
+          </a:xfrm>
+          <a:prstGeom prst="rect">
+            <a:avLst/>
+          </a:prstGeom>
+          <a:noFill/>
+          <a:ln w="9525">
+            <a:noFill/>
+            <a:headEnd/>
+            <a:tailEnd/>
+          </a:ln>
+        </p:spPr>
+      </p:pic>
+      <p:sp>
+        <p:nvSpPr>
+          <p:cNvPr id="1" name="TextBox 3"/>
+          <p:cNvSpPr txBox="1"/>
+          <p:nvPr/>
+        </p:nvSpPr>
+        <p:spPr>
+          <a:xfrm>
+            <a:off x="457200" y="4076700"/>
+            <a:ext cx="8229600" cy="508000"/>
+          </a:xfrm>
+          <a:prstGeom prst="rect">
+            <a:avLst/>
+          </a:prstGeom>
+          <a:noFill/>
+        </p:spPr>
+        <p:txBody>
+          <a:bodyPr/>
+          <a:lstStyle/>
+          <a:p>
+            <a:pPr lvl="0" indent="0" marL="0" algn="ctr">
+              <a:buNone/>
+            </a:pPr>
+            <a:r>
+              <a:rPr/>
+              <a:t>Adapted from UNESCO Quick Start Guide (2023)</a:t>
             </a:r>
           </a:p>
         </p:txBody>
@@ -5828,7 +5980,7 @@
             </a:pPr>
             <a:r>
               <a:rPr/>
-              <a:t>Questions to Guide Your Thinking</a:t>
+              <a:t>Quick Win: 30-Minute Experiment</a:t>
             </a:r>
           </a:p>
         </p:txBody>
@@ -5850,29 +6002,34 @@
           <a:p>
             <a:pPr lvl="0"/>
             <a:r>
-              <a:rPr/>
-              <a:t>Where can AI save time?</a:t>
+              <a:rPr b="1"/>
+              <a:t>What</a:t>
+            </a:r>
+            <a:r>
+              <a:rPr/>
+              <a:t>: Worksheet → HTML in 30 min</a:t>
             </a:r>
           </a:p>
           <a:p>
             <a:pPr lvl="0"/>
             <a:r>
-              <a:rPr/>
-              <a:t>How could students practice discipline-specific skills?</a:t>
+              <a:rPr b="1"/>
+              <a:t>Result</a:t>
+            </a:r>
+            <a:r>
+              <a:rPr/>
+              <a:t>: Upload both verisons, more engagement</a:t>
             </a:r>
           </a:p>
           <a:p>
             <a:pPr lvl="0"/>
             <a:r>
-              <a:rPr/>
-              <a:t>What risks/barriers must we prepare for?</a:t>
-            </a:r>
-          </a:p>
-          <a:p>
-            <a:pPr lvl="0"/>
-            <a:r>
-              <a:rPr/>
-              <a:t>How do we move past AI shame?</a:t>
+              <a:rPr b="1"/>
+              <a:t>Key Insight</a:t>
+            </a:r>
+            <a:r>
+              <a:rPr/>
+              <a:t>: Options, not replacements</a:t>
             </a:r>
           </a:p>
         </p:txBody>
@@ -5909,29 +6066,34 @@
             <p:ph type="title"/>
           </p:nvPr>
         </p:nvSpPr>
-        <p:spPr/>
-        <p:txBody>
-          <a:bodyPr/>
-          <a:lstStyle/>
-          <a:p>
-            <a:pPr lvl="0" indent="0" marL="0">
-              <a:buNone/>
-            </a:pPr>
-            <a:r>
-              <a:rPr/>
-              <a:t>Let’s Discuss</a:t>
-            </a:r>
-          </a:p>
-        </p:txBody>
-      </p:sp>
-      <p:sp>
-        <p:nvSpPr>
-          <p:cNvPr id="3" name="Content Placeholder 2"/>
-          <p:cNvSpPr>
-            <a:spLocks noGrp="1"/>
-          </p:cNvSpPr>
-          <p:nvPr>
-            <p:ph idx="1"/>
+        <p:spPr>
+          <a:xfrm>
+            <a:off x="457201" y="204787"/>
+            <a:ext cx="3008313" cy="871538"/>
+          </a:xfrm>
+        </p:spPr>
+        <p:txBody>
+          <a:bodyPr/>
+          <a:lstStyle/>
+          <a:p>
+            <a:pPr lvl="0" indent="0" marL="0">
+              <a:buNone/>
+            </a:pPr>
+            <a:r>
+              <a:rPr/>
+              <a:t>Showcase: Curriculum Curator (FLX)</a:t>
+            </a:r>
+          </a:p>
+        </p:txBody>
+      </p:sp>
+      <p:sp>
+        <p:nvSpPr>
+          <p:cNvPr id="4" name="Text Placeholder 3"/>
+          <p:cNvSpPr>
+            <a:spLocks noGrp="1"/>
+          </p:cNvSpPr>
+          <p:nvPr>
+            <p:ph idx="2" sz="half" type="body"/>
           </p:nvPr>
         </p:nvSpPr>
         <p:spPr/>
@@ -5941,33 +6103,68 @@
           <a:p>
             <a:pPr lvl="0"/>
             <a:r>
-              <a:rPr/>
-              <a:t>What’s one small thing you could try next week?</a:t>
+              <a:rPr b="1"/>
+              <a:t>Tool</a:t>
+            </a:r>
+            <a:r>
+              <a:rPr/>
+              <a:t>: Import → Restructure → Save 80% time</a:t>
             </a:r>
           </a:p>
           <a:p>
             <a:pPr lvl="0"/>
             <a:r>
-              <a:rPr/>
-              <a:t>What concerns need addressing?</a:t>
+              <a:rPr b="1"/>
+              <a:t>Value</a:t>
+            </a:r>
+            <a:r>
+              <a:rPr/>
+              <a:t>: Supports staff, not replaces</a:t>
             </a:r>
           </a:p>
           <a:p>
             <a:pPr lvl="0"/>
             <a:r>
-              <a:rPr/>
-              <a:t>How might your discipline benefit/challenge?</a:t>
-            </a:r>
-          </a:p>
-          <a:p>
-            <a:pPr lvl="0"/>
-            <a:r>
-              <a:rPr/>
-              <a:t>Have you felt AI shame?</a:t>
-            </a:r>
-          </a:p>
-        </p:txBody>
-      </p:sp>
+              <a:rPr b="1"/>
+              <a:t>Takeaway</a:t>
+            </a:r>
+            <a:r>
+              <a:rPr/>
+              <a:t>: Efficiency</a:t>
+            </a:r>
+          </a:p>
+        </p:txBody>
+      </p:sp>
+      <p:pic>
+        <p:nvPicPr>
+          <p:cNvPr descr="./assets/cur-curator.png" id="0" name="Picture 1"/>
+          <p:cNvPicPr>
+            <a:picLocks noGrp="1" noChangeAspect="1"/>
+          </p:cNvPicPr>
+          <p:nvPr/>
+        </p:nvPicPr>
+        <p:blipFill>
+          <a:blip r:embed="rId3"/>
+          <a:stretch>
+            <a:fillRect/>
+          </a:stretch>
+        </p:blipFill>
+        <p:spPr bwMode="auto">
+          <a:xfrm>
+            <a:off x="3568700" y="533400"/>
+            <a:ext cx="5105400" cy="3721100"/>
+          </a:xfrm>
+          <a:prstGeom prst="rect">
+            <a:avLst/>
+          </a:prstGeom>
+          <a:noFill/>
+          <a:ln w="9525">
+            <a:noFill/>
+            <a:headEnd/>
+            <a:tailEnd/>
+          </a:ln>
+        </p:spPr>
+      </p:pic>
     </p:spTree>
   </p:cSld>
 </p:sld>
@@ -6010,7 +6207,7 @@
             </a:pPr>
             <a:r>
               <a:rPr/>
-              <a:t>Thank You</a:t>
+              <a:t>Questions to Guide Your Thinking</a:t>
             </a:r>
           </a:p>
         </p:txBody>
@@ -6032,26 +6229,29 @@
           <a:p>
             <a:pPr lvl="0"/>
             <a:r>
-              <a:rPr i="1"/>
-              <a:t>“Not about answers — just questions worth asking… together, without shame”</a:t>
+              <a:rPr/>
+              <a:t>Where can AI save time?</a:t>
             </a:r>
           </a:p>
           <a:p>
             <a:pPr lvl="0"/>
             <a:r>
-              <a:rPr b="1"/>
-              <a:t>Next Step</a:t>
-            </a:r>
-            <a:r>
-              <a:rPr/>
-              <a:t>: Try one small experiment, share results</a:t>
+              <a:rPr/>
+              <a:t>How could students practice discipline-specific skills?</a:t>
             </a:r>
           </a:p>
           <a:p>
             <a:pPr lvl="0"/>
             <a:r>
-              <a:rPr i="1"/>
-              <a:t>“The best way to predict the future is to help create it”</a:t>
+              <a:rPr/>
+              <a:t>What risks/barriers must we prepare for?</a:t>
+            </a:r>
+          </a:p>
+          <a:p>
+            <a:pPr lvl="0"/>
+            <a:r>
+              <a:rPr/>
+              <a:t>How do we move past AI shame?</a:t>
             </a:r>
           </a:p>
         </p:txBody>
@@ -6062,6 +6262,185 @@
 </file>
 
 <file path=ppt/slides/slide15.xml><?xml version="1.0" encoding="utf-8"?>
+<p:sld xmlns:a="http://schemas.openxmlformats.org/drawingml/2006/main" xmlns:r="http://schemas.openxmlformats.org/officeDocument/2006/relationships" xmlns:p="http://schemas.openxmlformats.org/presentationml/2006/main">
+  <p:cSld>
+    <p:spTree>
+      <p:nvGrpSpPr>
+        <p:cNvPr id="1" name=""/>
+        <p:cNvGrpSpPr/>
+        <p:nvPr/>
+      </p:nvGrpSpPr>
+      <p:grpSpPr>
+        <a:xfrm>
+          <a:off x="0" y="0"/>
+          <a:ext cx="0" cy="0"/>
+          <a:chOff x="0" y="0"/>
+          <a:chExt cx="0" cy="0"/>
+        </a:xfrm>
+      </p:grpSpPr>
+      <p:sp>
+        <p:nvSpPr>
+          <p:cNvPr id="2" name="Title 1"/>
+          <p:cNvSpPr>
+            <a:spLocks noGrp="1"/>
+          </p:cNvSpPr>
+          <p:nvPr>
+            <p:ph type="title"/>
+          </p:nvPr>
+        </p:nvSpPr>
+        <p:spPr/>
+        <p:txBody>
+          <a:bodyPr/>
+          <a:lstStyle/>
+          <a:p>
+            <a:pPr lvl="0" indent="0" marL="0">
+              <a:buNone/>
+            </a:pPr>
+            <a:r>
+              <a:rPr/>
+              <a:t>Let’s Discuss</a:t>
+            </a:r>
+          </a:p>
+        </p:txBody>
+      </p:sp>
+      <p:sp>
+        <p:nvSpPr>
+          <p:cNvPr id="3" name="Content Placeholder 2"/>
+          <p:cNvSpPr>
+            <a:spLocks noGrp="1"/>
+          </p:cNvSpPr>
+          <p:nvPr>
+            <p:ph idx="1"/>
+          </p:nvPr>
+        </p:nvSpPr>
+        <p:spPr/>
+        <p:txBody>
+          <a:bodyPr/>
+          <a:lstStyle/>
+          <a:p>
+            <a:pPr lvl="0"/>
+            <a:r>
+              <a:rPr/>
+              <a:t>What’s one small thing you could try next week?</a:t>
+            </a:r>
+          </a:p>
+          <a:p>
+            <a:pPr lvl="0"/>
+            <a:r>
+              <a:rPr/>
+              <a:t>What concerns need addressing?</a:t>
+            </a:r>
+          </a:p>
+          <a:p>
+            <a:pPr lvl="0"/>
+            <a:r>
+              <a:rPr/>
+              <a:t>How might your discipline benefit/challenge?</a:t>
+            </a:r>
+          </a:p>
+          <a:p>
+            <a:pPr lvl="0"/>
+            <a:r>
+              <a:rPr/>
+              <a:t>Have you felt AI shame?</a:t>
+            </a:r>
+          </a:p>
+        </p:txBody>
+      </p:sp>
+    </p:spTree>
+  </p:cSld>
+</p:sld>
+</file>
+
+<file path=ppt/slides/slide16.xml><?xml version="1.0" encoding="utf-8"?>
+<p:sld xmlns:a="http://schemas.openxmlformats.org/drawingml/2006/main" xmlns:r="http://schemas.openxmlformats.org/officeDocument/2006/relationships" xmlns:p="http://schemas.openxmlformats.org/presentationml/2006/main">
+  <p:cSld>
+    <p:spTree>
+      <p:nvGrpSpPr>
+        <p:cNvPr id="1" name=""/>
+        <p:cNvGrpSpPr/>
+        <p:nvPr/>
+      </p:nvGrpSpPr>
+      <p:grpSpPr>
+        <a:xfrm>
+          <a:off x="0" y="0"/>
+          <a:ext cx="0" cy="0"/>
+          <a:chOff x="0" y="0"/>
+          <a:chExt cx="0" cy="0"/>
+        </a:xfrm>
+      </p:grpSpPr>
+      <p:sp>
+        <p:nvSpPr>
+          <p:cNvPr id="2" name="Title 1"/>
+          <p:cNvSpPr>
+            <a:spLocks noGrp="1"/>
+          </p:cNvSpPr>
+          <p:nvPr>
+            <p:ph type="title"/>
+          </p:nvPr>
+        </p:nvSpPr>
+        <p:spPr/>
+        <p:txBody>
+          <a:bodyPr/>
+          <a:lstStyle/>
+          <a:p>
+            <a:pPr lvl="0" indent="0" marL="0">
+              <a:buNone/>
+            </a:pPr>
+            <a:r>
+              <a:rPr/>
+              <a:t>Thank You</a:t>
+            </a:r>
+          </a:p>
+        </p:txBody>
+      </p:sp>
+      <p:sp>
+        <p:nvSpPr>
+          <p:cNvPr id="3" name="Content Placeholder 2"/>
+          <p:cNvSpPr>
+            <a:spLocks noGrp="1"/>
+          </p:cNvSpPr>
+          <p:nvPr>
+            <p:ph idx="1"/>
+          </p:nvPr>
+        </p:nvSpPr>
+        <p:spPr/>
+        <p:txBody>
+          <a:bodyPr/>
+          <a:lstStyle/>
+          <a:p>
+            <a:pPr lvl="0"/>
+            <a:r>
+              <a:rPr i="1"/>
+              <a:t>“Not about answers — just questions worth asking… together, without shame”</a:t>
+            </a:r>
+          </a:p>
+          <a:p>
+            <a:pPr lvl="0"/>
+            <a:r>
+              <a:rPr b="1"/>
+              <a:t>Next Step</a:t>
+            </a:r>
+            <a:r>
+              <a:rPr/>
+              <a:t>: Try one small experiment, share results</a:t>
+            </a:r>
+          </a:p>
+          <a:p>
+            <a:pPr lvl="0"/>
+            <a:r>
+              <a:rPr i="1"/>
+              <a:t>“The best way to predict the future is to help create it”</a:t>
+            </a:r>
+          </a:p>
+        </p:txBody>
+      </p:sp>
+    </p:spTree>
+  </p:cSld>
+</p:sld>
+</file>
+
+<file path=ppt/slides/slide17.xml><?xml version="1.0" encoding="utf-8"?>
 <p:sld xmlns:a="http://schemas.openxmlformats.org/drawingml/2006/main" xmlns:r="http://schemas.openxmlformats.org/officeDocument/2006/relationships" xmlns:p="http://schemas.openxmlformats.org/presentationml/2006/main">
   <p:cSld>
     <p:spTree>
@@ -6317,31 +6696,6 @@
       </p:grpSpPr>
       <p:sp>
         <p:nvSpPr>
-          <p:cNvPr id="2" name="Title 1"/>
-          <p:cNvSpPr>
-            <a:spLocks noGrp="1"/>
-          </p:cNvSpPr>
-          <p:nvPr>
-            <p:ph type="title"/>
-          </p:nvPr>
-        </p:nvSpPr>
-        <p:spPr/>
-        <p:txBody>
-          <a:bodyPr/>
-          <a:lstStyle/>
-          <a:p>
-            <a:pPr lvl="0" indent="0" marL="0">
-              <a:buNone/>
-            </a:pPr>
-            <a:r>
-              <a:rPr/>
-              <a:t>Framing the Conversation</a:t>
-            </a:r>
-          </a:p>
-        </p:txBody>
-      </p:sp>
-      <p:sp>
-        <p:nvSpPr>
           <p:cNvPr id="3" name="Content Placeholder 2"/>
           <p:cNvSpPr>
             <a:spLocks noGrp="1"/>
@@ -6354,35 +6708,6 @@
         <p:txBody>
           <a:bodyPr/>
           <a:lstStyle/>
-          <a:p>
-            <a:pPr lvl="0"/>
-            <a:r>
-              <a:rPr b="1"/>
-              <a:t>Reality Check</a:t>
-            </a:r>
-            <a:r>
-              <a:rPr/>
-              <a:t>: AI already in workflows; disciplines differ; no one-size-fits-all</a:t>
-            </a:r>
-          </a:p>
-          <a:p>
-            <a:pPr lvl="0"/>
-            <a:r>
-              <a:rPr b="1"/>
-              <a:t>Today’s Goal</a:t>
-            </a:r>
-            <a:r>
-              <a:rPr/>
-              <a:t>: Share challenges &amp; spark reflection</a:t>
-            </a:r>
-          </a:p>
-          <a:p>
-            <a:pPr lvl="0"/>
-            <a:r>
-              <a:rPr i="1"/>
-              <a:t>“Not about answers — just questions worth asking”</a:t>
-            </a:r>
-          </a:p>
           <a:p>
             <a:pPr lvl="0" indent="0" marL="0">
               <a:buNone/>
@@ -6436,7 +6761,7 @@
             </a:pPr>
             <a:r>
               <a:rPr/>
-              <a:t>Over-Trust: The “Fountain of Knowledge” Problem</a:t>
+              <a:t>Today: 15 Minutes to Shift Perspective</a:t>
             </a:r>
           </a:p>
         </p:txBody>
@@ -6456,37 +6781,38 @@
           <a:bodyPr/>
           <a:lstStyle/>
           <a:p>
-            <a:pPr lvl="0"/>
+            <a:pPr lvl="0" indent="0" marL="0">
+              <a:buNone/>
+            </a:pPr>
             <a:r>
               <a:rPr b="1"/>
-              <a:t>Challenge</a:t>
-            </a:r>
-            <a:r>
-              <a:rPr/>
-              <a:t>: Students over-trust AI</a:t>
-            </a:r>
-          </a:p>
-          <a:p>
-            <a:pPr lvl="0"/>
+              <a:t>We’ll explore:</a:t>
+            </a:r>
+            <a:r>
+              <a:rPr/>
+              <a:t> - Four challenges we’re all facing - One hidden barrier we don’t discuss - Three pathways forward - Your questions and experiences</a:t>
+            </a:r>
+          </a:p>
+          <a:p>
+            <a:pPr lvl="0" indent="0" marL="0">
+              <a:buNone/>
+            </a:pPr>
             <a:r>
               <a:rPr b="1"/>
-              <a:t>Impact</a:t>
-            </a:r>
-            <a:r>
-              <a:rPr/>
-              <a:t>: Weakens critical thinking</a:t>
-            </a:r>
-            <a:br/>
-          </a:p>
-          <a:p>
-            <a:pPr lvl="0"/>
-            <a:r>
-              <a:rPr b="1"/>
-              <a:t>Response</a:t>
-            </a:r>
-            <a:r>
-              <a:rPr/>
-              <a:t>: Error-spotting, critique, reward questioning</a:t>
+              <a:t>Not covering:</a:t>
+            </a:r>
+            <a:r>
+              <a:rPr/>
+              <a:t> - How AI works - Which tools to use - Detection strategies - Policy development</a:t>
+            </a:r>
+          </a:p>
+          <a:p>
+            <a:pPr lvl="0" indent="0" marL="0">
+              <a:buNone/>
+            </a:pPr>
+            <a:r>
+              <a:rPr i="1"/>
+              <a:t>“Not about answers — just questions worth asking”</a:t>
             </a:r>
           </a:p>
         </p:txBody>
@@ -6497,6 +6823,103 @@
 </file>
 
 <file path=ppt/slides/slide5.xml><?xml version="1.0" encoding="utf-8"?>
+<p:sld xmlns:a="http://schemas.openxmlformats.org/drawingml/2006/main" xmlns:r="http://schemas.openxmlformats.org/officeDocument/2006/relationships" xmlns:p="http://schemas.openxmlformats.org/presentationml/2006/main">
+  <p:cSld>
+    <p:spTree>
+      <p:nvGrpSpPr>
+        <p:cNvPr id="1" name=""/>
+        <p:cNvGrpSpPr/>
+        <p:nvPr/>
+      </p:nvGrpSpPr>
+      <p:grpSpPr>
+        <a:xfrm>
+          <a:off x="0" y="0"/>
+          <a:ext cx="0" cy="0"/>
+          <a:chOff x="0" y="0"/>
+          <a:chExt cx="0" cy="0"/>
+        </a:xfrm>
+      </p:grpSpPr>
+      <p:sp>
+        <p:nvSpPr>
+          <p:cNvPr id="2" name="Title 1"/>
+          <p:cNvSpPr>
+            <a:spLocks noGrp="1"/>
+          </p:cNvSpPr>
+          <p:nvPr>
+            <p:ph type="title"/>
+          </p:nvPr>
+        </p:nvSpPr>
+        <p:spPr/>
+        <p:txBody>
+          <a:bodyPr/>
+          <a:lstStyle/>
+          <a:p>
+            <a:pPr lvl="0" indent="0" marL="0">
+              <a:buNone/>
+            </a:pPr>
+            <a:r>
+              <a:rPr/>
+              <a:t>Over-Trust: The “Fountain of Knowledge” Problem</a:t>
+            </a:r>
+          </a:p>
+        </p:txBody>
+      </p:sp>
+      <p:sp>
+        <p:nvSpPr>
+          <p:cNvPr id="3" name="Content Placeholder 2"/>
+          <p:cNvSpPr>
+            <a:spLocks noGrp="1"/>
+          </p:cNvSpPr>
+          <p:nvPr>
+            <p:ph idx="1"/>
+          </p:nvPr>
+        </p:nvSpPr>
+        <p:spPr/>
+        <p:txBody>
+          <a:bodyPr/>
+          <a:lstStyle/>
+          <a:p>
+            <a:pPr lvl="0"/>
+            <a:r>
+              <a:rPr b="1"/>
+              <a:t>Challenge</a:t>
+            </a:r>
+            <a:r>
+              <a:rPr/>
+              <a:t>: Students over-trust AI</a:t>
+            </a:r>
+          </a:p>
+          <a:p>
+            <a:pPr lvl="0"/>
+            <a:r>
+              <a:rPr b="1"/>
+              <a:t>Impact</a:t>
+            </a:r>
+            <a:r>
+              <a:rPr/>
+              <a:t>: Weakens critical thinking</a:t>
+            </a:r>
+            <a:br/>
+          </a:p>
+          <a:p>
+            <a:pPr lvl="0"/>
+            <a:r>
+              <a:rPr b="1"/>
+              <a:t>Response</a:t>
+            </a:r>
+            <a:r>
+              <a:rPr/>
+              <a:t>: Error-spotting, critique, reward questioning</a:t>
+            </a:r>
+          </a:p>
+        </p:txBody>
+      </p:sp>
+    </p:spTree>
+  </p:cSld>
+</p:sld>
+</file>
+
+<file path=ppt/slides/slide6.xml><?xml version="1.0" encoding="utf-8"?>
 <p:sld xmlns:a="http://schemas.openxmlformats.org/drawingml/2006/main" xmlns:r="http://schemas.openxmlformats.org/officeDocument/2006/relationships" xmlns:p="http://schemas.openxmlformats.org/presentationml/2006/main">
   <p:cSld>
     <p:spTree>
@@ -6652,105 +7075,6 @@
 </p:sld>
 </file>
 
-<file path=ppt/slides/slide6.xml><?xml version="1.0" encoding="utf-8"?>
-<p:sld xmlns:a="http://schemas.openxmlformats.org/drawingml/2006/main" xmlns:r="http://schemas.openxmlformats.org/officeDocument/2006/relationships" xmlns:p="http://schemas.openxmlformats.org/presentationml/2006/main">
-  <p:cSld>
-    <p:spTree>
-      <p:nvGrpSpPr>
-        <p:cNvPr id="1" name=""/>
-        <p:cNvGrpSpPr/>
-        <p:nvPr/>
-      </p:nvGrpSpPr>
-      <p:grpSpPr>
-        <a:xfrm>
-          <a:off x="0" y="0"/>
-          <a:ext cx="0" cy="0"/>
-          <a:chOff x="0" y="0"/>
-          <a:chExt cx="0" cy="0"/>
-        </a:xfrm>
-      </p:grpSpPr>
-      <p:sp>
-        <p:nvSpPr>
-          <p:cNvPr id="2" name="Title 1"/>
-          <p:cNvSpPr>
-            <a:spLocks noGrp="1"/>
-          </p:cNvSpPr>
-          <p:nvPr>
-            <p:ph type="title"/>
-          </p:nvPr>
-        </p:nvSpPr>
-        <p:spPr/>
-        <p:txBody>
-          <a:bodyPr/>
-          <a:lstStyle/>
-          <a:p>
-            <a:pPr lvl="0" indent="0" marL="0">
-              <a:buNone/>
-            </a:pPr>
-            <a:r>
-              <a:rPr/>
-              <a:t>Misplaced Blame: It’s Not the Tool</a:t>
-            </a:r>
-          </a:p>
-        </p:txBody>
-      </p:sp>
-      <p:sp>
-        <p:nvSpPr>
-          <p:cNvPr id="3" name="Content Placeholder 2"/>
-          <p:cNvSpPr>
-            <a:spLocks noGrp="1"/>
-          </p:cNvSpPr>
-          <p:nvPr>
-            <p:ph idx="1"/>
-          </p:nvPr>
-        </p:nvSpPr>
-        <p:spPr/>
-        <p:txBody>
-          <a:bodyPr/>
-          <a:lstStyle/>
-          <a:p>
-            <a:pPr lvl="0"/>
-            <a:r>
-              <a:rPr b="1"/>
-              <a:t>Challenge</a:t>
-            </a:r>
-            <a:r>
-              <a:rPr/>
-              <a:t>: Staff blame AI for integrity issues</a:t>
-            </a:r>
-          </a:p>
-          <a:p>
-            <a:pPr lvl="0"/>
-            <a:r>
-              <a:rPr b="1"/>
-              <a:t>Response</a:t>
-            </a:r>
-            <a:r>
-              <a:rPr/>
-              <a:t>: Adapt assessment, don’t ban</a:t>
-            </a:r>
-          </a:p>
-          <a:p>
-            <a:pPr lvl="1"/>
-            <a:r>
-              <a:rPr/>
-              <a:t>Authentic, Personalised, Reflective</a:t>
-            </a:r>
-          </a:p>
-          <a:p>
-            <a:pPr lvl="0"/>
-            <a:r>
-              <a:rPr i="1"/>
-              <a:t>Past tools changed assessment, AI will too</a:t>
-            </a:r>
-          </a:p>
-        </p:txBody>
-      </p:sp>
-    </p:spTree>
-  </p:cSld>
-</p:sld>
-</file>
-
 <file path=ppt/slides/slide7.xml><?xml version="1.0" encoding="utf-8"?>
 <p:sld xmlns:a="http://schemas.openxmlformats.org/drawingml/2006/main" xmlns:r="http://schemas.openxmlformats.org/officeDocument/2006/relationships" xmlns:p="http://schemas.openxmlformats.org/presentationml/2006/main">
   <p:cSld>
@@ -6788,7 +7112,7 @@
             </a:pPr>
             <a:r>
               <a:rPr/>
-              <a:t>Fear of AI: The Root of Resistance</a:t>
+              <a:t>Misplaced Blame: It’s Not the Tool</a:t>
             </a:r>
           </a:p>
         </p:txBody>
@@ -6811,54 +7135,36 @@
             <a:pPr lvl="0"/>
             <a:r>
               <a:rPr b="1"/>
-              <a:t>The Fear</a:t>
-            </a:r>
-            <a:r>
-              <a:rPr/>
-              <a:t>: “AI will replace me” | “I’ll become obsolete” | “My expertise won’t matter”</a:t>
+              <a:t>Challenge</a:t>
+            </a:r>
+            <a:r>
+              <a:rPr/>
+              <a:t>: Staff blame AI for integrity issues</a:t>
             </a:r>
           </a:p>
           <a:p>
             <a:pPr lvl="0"/>
             <a:r>
               <a:rPr b="1"/>
-              <a:t>The Reality</a:t>
-            </a:r>
-            <a:r>
-              <a:rPr/>
-              <a:t>: Every new tool sparked fear</a:t>
+              <a:t>Response</a:t>
+            </a:r>
+            <a:r>
+              <a:rPr/>
+              <a:t>: Adapt assessment, don’t ban</a:t>
             </a:r>
           </a:p>
           <a:p>
             <a:pPr lvl="1"/>
             <a:r>
               <a:rPr/>
-              <a:t>Printing press → scribes worried</a:t>
-            </a:r>
-          </a:p>
-          <a:p>
-            <a:pPr lvl="1"/>
-            <a:r>
-              <a:rPr/>
-              <a:t>Calculators → mathematicians concerned</a:t>
-            </a:r>
-          </a:p>
-          <a:p>
-            <a:pPr lvl="1"/>
-            <a:r>
-              <a:rPr/>
-              <a:t>Internet → everyone panicked</a:t>
+              <a:t>Authentic, Personalised, Reflective</a:t>
             </a:r>
           </a:p>
           <a:p>
             <a:pPr lvl="0"/>
             <a:r>
-              <a:rPr b="1"/>
-              <a:t>The Pattern</a:t>
-            </a:r>
-            <a:r>
-              <a:rPr/>
-              <a:t>: Those who adapted thrived</a:t>
+              <a:rPr i="1"/>
+              <a:t>Past tools changed assessment, AI will too</a:t>
             </a:r>
           </a:p>
         </p:txBody>
@@ -6905,7 +7211,7 @@
             </a:pPr>
             <a:r>
               <a:rPr/>
-              <a:t>AI Shame: The Hidden Barrier</a:t>
+              <a:t>Fear of AI: The Root of Resistance</a:t>
             </a:r>
           </a:p>
         </p:txBody>
@@ -6928,33 +7234,54 @@
             <a:pPr lvl="0"/>
             <a:r>
               <a:rPr b="1"/>
-              <a:t>Challenge</a:t>
-            </a:r>
-            <a:r>
-              <a:rPr/>
-              <a:t>: Students &amp; staff feel guilt/cheating</a:t>
+              <a:t>The Fear</a:t>
+            </a:r>
+            <a:r>
+              <a:rPr/>
+              <a:t>: “AI will replace me” | “I’ll become obsolete” | “My expertise won’t matter”</a:t>
             </a:r>
           </a:p>
           <a:p>
             <a:pPr lvl="0"/>
             <a:r>
               <a:rPr b="1"/>
-              <a:t>Impact</a:t>
-            </a:r>
-            <a:r>
-              <a:rPr/>
-              <a:t>: Underground use, stress, lost learning</a:t>
+              <a:t>The Reality</a:t>
+            </a:r>
+            <a:r>
+              <a:rPr/>
+              <a:t>: Every new tool sparked fear</a:t>
+            </a:r>
+          </a:p>
+          <a:p>
+            <a:pPr lvl="1"/>
+            <a:r>
+              <a:rPr/>
+              <a:t>Printing press → scribes worried</a:t>
+            </a:r>
+          </a:p>
+          <a:p>
+            <a:pPr lvl="1"/>
+            <a:r>
+              <a:rPr/>
+              <a:t>Calculators → mathematicians concerned</a:t>
+            </a:r>
+          </a:p>
+          <a:p>
+            <a:pPr lvl="1"/>
+            <a:r>
+              <a:rPr/>
+              <a:t>Internet → everyone panicked</a:t>
             </a:r>
           </a:p>
           <a:p>
             <a:pPr lvl="0"/>
             <a:r>
               <a:rPr b="1"/>
-              <a:t>Response</a:t>
-            </a:r>
-            <a:r>
-              <a:rPr/>
-              <a:t>: Normalise, Teach process, Share examples</a:t>
+              <a:t>The Pattern</a:t>
+            </a:r>
+            <a:r>
+              <a:rPr/>
+              <a:t>: Those who adapted thrived</a:t>
             </a:r>
           </a:p>
         </p:txBody>
@@ -7001,7 +7328,7 @@
             </a:pPr>
             <a:r>
               <a:rPr/>
-              <a:t>Three Practical Pathways</a:t>
+              <a:t>AI Shame: The Hidden Barrier</a:t>
             </a:r>
           </a:p>
         </p:txBody>
@@ -7021,42 +7348,36 @@
           <a:bodyPr/>
           <a:lstStyle/>
           <a:p>
-            <a:pPr lvl="0" indent="-342900" marL="342900">
-              <a:buAutoNum type="arabicPeriod"/>
-            </a:pPr>
+            <a:pPr lvl="0"/>
             <a:r>
               <a:rPr b="1"/>
-              <a:t>Learning Assistant</a:t>
-            </a:r>
-            <a:r>
-              <a:rPr/>
-              <a:t>: Brainstorm, counter-arguments, debugging</a:t>
-            </a:r>
-          </a:p>
-          <a:p>
-            <a:pPr lvl="0" indent="-342900" marL="342900">
-              <a:buAutoNum type="arabicPeriod"/>
-            </a:pPr>
+              <a:t>Challenge</a:t>
+            </a:r>
+            <a:r>
+              <a:rPr/>
+              <a:t>: Students &amp; staff feel guilt/cheating</a:t>
+            </a:r>
+          </a:p>
+          <a:p>
+            <a:pPr lvl="0"/>
             <a:r>
               <a:rPr b="1"/>
-              <a:t>Teaching Partner</a:t>
-            </a:r>
-            <a:r>
-              <a:rPr/>
-              <a:t>: Practice problems, draft feedback, adaptive tasks</a:t>
-            </a:r>
-          </a:p>
-          <a:p>
-            <a:pPr lvl="0" indent="-342900" marL="342900">
-              <a:buAutoNum type="arabicPeriod"/>
-            </a:pPr>
+              <a:t>Impact</a:t>
+            </a:r>
+            <a:r>
+              <a:rPr/>
+              <a:t>: Underground use, stress, lost learning</a:t>
+            </a:r>
+          </a:p>
+          <a:p>
+            <a:pPr lvl="0"/>
             <a:r>
               <a:rPr b="1"/>
-              <a:t>Discipline Tool</a:t>
-            </a:r>
-            <a:r>
-              <a:rPr/>
-              <a:t>: Engineering, Business, Health, Arts</a:t>
+              <a:t>Response</a:t>
+            </a:r>
+            <a:r>
+              <a:rPr/>
+              <a:t>: Normalise, Teach process, Share examples</a:t>
             </a:r>
           </a:p>
         </p:txBody>

</xml_diff>